<commit_message>
Cesped + Menu ayuda
-Correccion agentes en pausa
-Booleanos y controles para varias cosas
-PreDisplay() en Scene
</commit_message>
<xml_diff>
--- a/Documentacion/Sprites.pptx
+++ b/Documentacion/Sprites.pptx
@@ -4,14 +4,17 @@
   <p:sldMasterIdLst>
     <p:sldMasterId id="2147483648" r:id="rId1"/>
   </p:sldMasterIdLst>
+  <p:notesMasterIdLst>
+    <p:notesMasterId r:id="rId9"/>
+  </p:notesMasterIdLst>
   <p:sldIdLst>
     <p:sldId id="262" r:id="rId2"/>
-    <p:sldId id="256" r:id="rId3"/>
-    <p:sldId id="257" r:id="rId4"/>
-    <p:sldId id="258" r:id="rId5"/>
-    <p:sldId id="259" r:id="rId6"/>
-    <p:sldId id="260" r:id="rId7"/>
-    <p:sldId id="261" r:id="rId8"/>
+    <p:sldId id="261" r:id="rId3"/>
+    <p:sldId id="256" r:id="rId4"/>
+    <p:sldId id="257" r:id="rId5"/>
+    <p:sldId id="258" r:id="rId6"/>
+    <p:sldId id="259" r:id="rId7"/>
+    <p:sldId id="260" r:id="rId8"/>
   </p:sldIdLst>
   <p:sldSz cx="12192000" cy="6858000"/>
   <p:notesSz cx="6858000" cy="9144000"/>
@@ -118,6 +121,440 @@
 </p:presentation>
 </file>
 
+<file path=ppt/notesMasters/notesMaster1.xml><?xml version="1.0" encoding="utf-8"?>
+<p:notesMaster xmlns:a="http://schemas.openxmlformats.org/drawingml/2006/main" xmlns:r="http://schemas.openxmlformats.org/officeDocument/2006/relationships" xmlns:p="http://schemas.openxmlformats.org/presentationml/2006/main">
+  <p:cSld>
+    <p:bg>
+      <p:bgRef idx="1001">
+        <a:schemeClr val="bg1"/>
+      </p:bgRef>
+    </p:bg>
+    <p:spTree>
+      <p:nvGrpSpPr>
+        <p:cNvPr id="1" name=""/>
+        <p:cNvGrpSpPr/>
+        <p:nvPr/>
+      </p:nvGrpSpPr>
+      <p:grpSpPr>
+        <a:xfrm>
+          <a:off x="0" y="0"/>
+          <a:ext cx="0" cy="0"/>
+          <a:chOff x="0" y="0"/>
+          <a:chExt cx="0" cy="0"/>
+        </a:xfrm>
+      </p:grpSpPr>
+      <p:sp>
+        <p:nvSpPr>
+          <p:cNvPr id="2" name="Marcador de encabezado 1"/>
+          <p:cNvSpPr>
+            <a:spLocks noGrp="1"/>
+          </p:cNvSpPr>
+          <p:nvPr>
+            <p:ph type="hdr" sz="quarter"/>
+          </p:nvPr>
+        </p:nvSpPr>
+        <p:spPr>
+          <a:xfrm>
+            <a:off x="0" y="0"/>
+            <a:ext cx="2971800" cy="458788"/>
+          </a:xfrm>
+          <a:prstGeom prst="rect">
+            <a:avLst/>
+          </a:prstGeom>
+        </p:spPr>
+        <p:txBody>
+          <a:bodyPr vert="horz" lIns="91440" tIns="45720" rIns="91440" bIns="45720" rtlCol="0"/>
+          <a:lstStyle>
+            <a:lvl1pPr algn="l">
+              <a:defRPr sz="1200"/>
+            </a:lvl1pPr>
+          </a:lstStyle>
+          <a:p>
+            <a:endParaRPr lang="es-CR"/>
+          </a:p>
+        </p:txBody>
+      </p:sp>
+      <p:sp>
+        <p:nvSpPr>
+          <p:cNvPr id="3" name="Marcador de fecha 2"/>
+          <p:cNvSpPr>
+            <a:spLocks noGrp="1"/>
+          </p:cNvSpPr>
+          <p:nvPr>
+            <p:ph type="dt" idx="1"/>
+          </p:nvPr>
+        </p:nvSpPr>
+        <p:spPr>
+          <a:xfrm>
+            <a:off x="3884613" y="0"/>
+            <a:ext cx="2971800" cy="458788"/>
+          </a:xfrm>
+          <a:prstGeom prst="rect">
+            <a:avLst/>
+          </a:prstGeom>
+        </p:spPr>
+        <p:txBody>
+          <a:bodyPr vert="horz" lIns="91440" tIns="45720" rIns="91440" bIns="45720" rtlCol="0"/>
+          <a:lstStyle>
+            <a:lvl1pPr algn="r">
+              <a:defRPr sz="1200"/>
+            </a:lvl1pPr>
+          </a:lstStyle>
+          <a:p>
+            <a:fld id="{019ED992-5630-49CB-AAB3-1739CCFCA183}" type="datetimeFigureOut">
+              <a:rPr lang="es-CR" smtClean="0"/>
+              <a:t>3/11/2024</a:t>
+            </a:fld>
+            <a:endParaRPr lang="es-CR"/>
+          </a:p>
+        </p:txBody>
+      </p:sp>
+      <p:sp>
+        <p:nvSpPr>
+          <p:cNvPr id="4" name="Marcador de imagen de diapositiva 3"/>
+          <p:cNvSpPr>
+            <a:spLocks noGrp="1" noRot="1" noChangeAspect="1"/>
+          </p:cNvSpPr>
+          <p:nvPr>
+            <p:ph type="sldImg" idx="2"/>
+          </p:nvPr>
+        </p:nvSpPr>
+        <p:spPr>
+          <a:xfrm>
+            <a:off x="685800" y="1143000"/>
+            <a:ext cx="5486400" cy="3086100"/>
+          </a:xfrm>
+          <a:prstGeom prst="rect">
+            <a:avLst/>
+          </a:prstGeom>
+          <a:noFill/>
+          <a:ln w="12700">
+            <a:solidFill>
+              <a:prstClr val="black"/>
+            </a:solidFill>
+          </a:ln>
+        </p:spPr>
+        <p:txBody>
+          <a:bodyPr vert="horz" lIns="91440" tIns="45720" rIns="91440" bIns="45720" rtlCol="0" anchor="ctr"/>
+          <a:lstStyle/>
+          <a:p>
+            <a:endParaRPr lang="es-CR"/>
+          </a:p>
+        </p:txBody>
+      </p:sp>
+      <p:sp>
+        <p:nvSpPr>
+          <p:cNvPr id="5" name="Marcador de notas 4"/>
+          <p:cNvSpPr>
+            <a:spLocks noGrp="1"/>
+          </p:cNvSpPr>
+          <p:nvPr>
+            <p:ph type="body" sz="quarter" idx="3"/>
+          </p:nvPr>
+        </p:nvSpPr>
+        <p:spPr>
+          <a:xfrm>
+            <a:off x="685800" y="4400550"/>
+            <a:ext cx="5486400" cy="3600450"/>
+          </a:xfrm>
+          <a:prstGeom prst="rect">
+            <a:avLst/>
+          </a:prstGeom>
+        </p:spPr>
+        <p:txBody>
+          <a:bodyPr vert="horz" lIns="91440" tIns="45720" rIns="91440" bIns="45720" rtlCol="0"/>
+          <a:lstStyle/>
+          <a:p>
+            <a:pPr lvl="0"/>
+            <a:r>
+              <a:rPr lang="es-ES"/>
+              <a:t>Haga clic para modificar los estilos de texto del patrón</a:t>
+            </a:r>
+          </a:p>
+          <a:p>
+            <a:pPr lvl="1"/>
+            <a:r>
+              <a:rPr lang="es-ES"/>
+              <a:t>Segundo nivel</a:t>
+            </a:r>
+          </a:p>
+          <a:p>
+            <a:pPr lvl="2"/>
+            <a:r>
+              <a:rPr lang="es-ES"/>
+              <a:t>Tercer nivel</a:t>
+            </a:r>
+          </a:p>
+          <a:p>
+            <a:pPr lvl="3"/>
+            <a:r>
+              <a:rPr lang="es-ES"/>
+              <a:t>Cuarto nivel</a:t>
+            </a:r>
+          </a:p>
+          <a:p>
+            <a:pPr lvl="4"/>
+            <a:r>
+              <a:rPr lang="es-ES"/>
+              <a:t>Quinto nivel</a:t>
+            </a:r>
+            <a:endParaRPr lang="es-CR"/>
+          </a:p>
+        </p:txBody>
+      </p:sp>
+      <p:sp>
+        <p:nvSpPr>
+          <p:cNvPr id="6" name="Marcador de pie de página 5"/>
+          <p:cNvSpPr>
+            <a:spLocks noGrp="1"/>
+          </p:cNvSpPr>
+          <p:nvPr>
+            <p:ph type="ftr" sz="quarter" idx="4"/>
+          </p:nvPr>
+        </p:nvSpPr>
+        <p:spPr>
+          <a:xfrm>
+            <a:off x="0" y="8685213"/>
+            <a:ext cx="2971800" cy="458787"/>
+          </a:xfrm>
+          <a:prstGeom prst="rect">
+            <a:avLst/>
+          </a:prstGeom>
+        </p:spPr>
+        <p:txBody>
+          <a:bodyPr vert="horz" lIns="91440" tIns="45720" rIns="91440" bIns="45720" rtlCol="0" anchor="b"/>
+          <a:lstStyle>
+            <a:lvl1pPr algn="l">
+              <a:defRPr sz="1200"/>
+            </a:lvl1pPr>
+          </a:lstStyle>
+          <a:p>
+            <a:endParaRPr lang="es-CR"/>
+          </a:p>
+        </p:txBody>
+      </p:sp>
+      <p:sp>
+        <p:nvSpPr>
+          <p:cNvPr id="7" name="Marcador de número de diapositiva 6"/>
+          <p:cNvSpPr>
+            <a:spLocks noGrp="1"/>
+          </p:cNvSpPr>
+          <p:nvPr>
+            <p:ph type="sldNum" sz="quarter" idx="5"/>
+          </p:nvPr>
+        </p:nvSpPr>
+        <p:spPr>
+          <a:xfrm>
+            <a:off x="3884613" y="8685213"/>
+            <a:ext cx="2971800" cy="458787"/>
+          </a:xfrm>
+          <a:prstGeom prst="rect">
+            <a:avLst/>
+          </a:prstGeom>
+        </p:spPr>
+        <p:txBody>
+          <a:bodyPr vert="horz" lIns="91440" tIns="45720" rIns="91440" bIns="45720" rtlCol="0" anchor="b"/>
+          <a:lstStyle>
+            <a:lvl1pPr algn="r">
+              <a:defRPr sz="1200"/>
+            </a:lvl1pPr>
+          </a:lstStyle>
+          <a:p>
+            <a:fld id="{31023962-D872-411F-99A7-2359604E1F56}" type="slidenum">
+              <a:rPr lang="es-CR" smtClean="0"/>
+              <a:t>‹Nº›</a:t>
+            </a:fld>
+            <a:endParaRPr lang="es-CR"/>
+          </a:p>
+        </p:txBody>
+      </p:sp>
+    </p:spTree>
+    <p:extLst>
+      <p:ext uri="{BB962C8B-B14F-4D97-AF65-F5344CB8AC3E}">
+        <p14:creationId xmlns:p14="http://schemas.microsoft.com/office/powerpoint/2010/main" val="4068026258"/>
+      </p:ext>
+    </p:extLst>
+  </p:cSld>
+  <p:clrMap bg1="lt1" tx1="dk1" bg2="lt2" tx2="dk2" accent1="accent1" accent2="accent2" accent3="accent3" accent4="accent4" accent5="accent5" accent6="accent6" hlink="hlink" folHlink="folHlink"/>
+  <p:notesStyle>
+    <a:lvl1pPr marL="0" algn="l" defTabSz="914400" rtl="0" eaLnBrk="1" latinLnBrk="0" hangingPunct="1">
+      <a:defRPr sz="1200" kern="1200">
+        <a:solidFill>
+          <a:schemeClr val="tx1"/>
+        </a:solidFill>
+        <a:latin typeface="+mn-lt"/>
+        <a:ea typeface="+mn-ea"/>
+        <a:cs typeface="+mn-cs"/>
+      </a:defRPr>
+    </a:lvl1pPr>
+    <a:lvl2pPr marL="457200" algn="l" defTabSz="914400" rtl="0" eaLnBrk="1" latinLnBrk="0" hangingPunct="1">
+      <a:defRPr sz="1200" kern="1200">
+        <a:solidFill>
+          <a:schemeClr val="tx1"/>
+        </a:solidFill>
+        <a:latin typeface="+mn-lt"/>
+        <a:ea typeface="+mn-ea"/>
+        <a:cs typeface="+mn-cs"/>
+      </a:defRPr>
+    </a:lvl2pPr>
+    <a:lvl3pPr marL="914400" algn="l" defTabSz="914400" rtl="0" eaLnBrk="1" latinLnBrk="0" hangingPunct="1">
+      <a:defRPr sz="1200" kern="1200">
+        <a:solidFill>
+          <a:schemeClr val="tx1"/>
+        </a:solidFill>
+        <a:latin typeface="+mn-lt"/>
+        <a:ea typeface="+mn-ea"/>
+        <a:cs typeface="+mn-cs"/>
+      </a:defRPr>
+    </a:lvl3pPr>
+    <a:lvl4pPr marL="1371600" algn="l" defTabSz="914400" rtl="0" eaLnBrk="1" latinLnBrk="0" hangingPunct="1">
+      <a:defRPr sz="1200" kern="1200">
+        <a:solidFill>
+          <a:schemeClr val="tx1"/>
+        </a:solidFill>
+        <a:latin typeface="+mn-lt"/>
+        <a:ea typeface="+mn-ea"/>
+        <a:cs typeface="+mn-cs"/>
+      </a:defRPr>
+    </a:lvl4pPr>
+    <a:lvl5pPr marL="1828800" algn="l" defTabSz="914400" rtl="0" eaLnBrk="1" latinLnBrk="0" hangingPunct="1">
+      <a:defRPr sz="1200" kern="1200">
+        <a:solidFill>
+          <a:schemeClr val="tx1"/>
+        </a:solidFill>
+        <a:latin typeface="+mn-lt"/>
+        <a:ea typeface="+mn-ea"/>
+        <a:cs typeface="+mn-cs"/>
+      </a:defRPr>
+    </a:lvl5pPr>
+    <a:lvl6pPr marL="2286000" algn="l" defTabSz="914400" rtl="0" eaLnBrk="1" latinLnBrk="0" hangingPunct="1">
+      <a:defRPr sz="1200" kern="1200">
+        <a:solidFill>
+          <a:schemeClr val="tx1"/>
+        </a:solidFill>
+        <a:latin typeface="+mn-lt"/>
+        <a:ea typeface="+mn-ea"/>
+        <a:cs typeface="+mn-cs"/>
+      </a:defRPr>
+    </a:lvl6pPr>
+    <a:lvl7pPr marL="2743200" algn="l" defTabSz="914400" rtl="0" eaLnBrk="1" latinLnBrk="0" hangingPunct="1">
+      <a:defRPr sz="1200" kern="1200">
+        <a:solidFill>
+          <a:schemeClr val="tx1"/>
+        </a:solidFill>
+        <a:latin typeface="+mn-lt"/>
+        <a:ea typeface="+mn-ea"/>
+        <a:cs typeface="+mn-cs"/>
+      </a:defRPr>
+    </a:lvl7pPr>
+    <a:lvl8pPr marL="3200400" algn="l" defTabSz="914400" rtl="0" eaLnBrk="1" latinLnBrk="0" hangingPunct="1">
+      <a:defRPr sz="1200" kern="1200">
+        <a:solidFill>
+          <a:schemeClr val="tx1"/>
+        </a:solidFill>
+        <a:latin typeface="+mn-lt"/>
+        <a:ea typeface="+mn-ea"/>
+        <a:cs typeface="+mn-cs"/>
+      </a:defRPr>
+    </a:lvl8pPr>
+    <a:lvl9pPr marL="3657600" algn="l" defTabSz="914400" rtl="0" eaLnBrk="1" latinLnBrk="0" hangingPunct="1">
+      <a:defRPr sz="1200" kern="1200">
+        <a:solidFill>
+          <a:schemeClr val="tx1"/>
+        </a:solidFill>
+        <a:latin typeface="+mn-lt"/>
+        <a:ea typeface="+mn-ea"/>
+        <a:cs typeface="+mn-cs"/>
+      </a:defRPr>
+    </a:lvl9pPr>
+  </p:notesStyle>
+</p:notesMaster>
+</file>
+
+<file path=ppt/notesSlides/notesSlide1.xml><?xml version="1.0" encoding="utf-8"?>
+<p:notes xmlns:a="http://schemas.openxmlformats.org/drawingml/2006/main" xmlns:r="http://schemas.openxmlformats.org/officeDocument/2006/relationships" xmlns:p="http://schemas.openxmlformats.org/presentationml/2006/main">
+  <p:cSld>
+    <p:spTree>
+      <p:nvGrpSpPr>
+        <p:cNvPr id="1" name=""/>
+        <p:cNvGrpSpPr/>
+        <p:nvPr/>
+      </p:nvGrpSpPr>
+      <p:grpSpPr>
+        <a:xfrm>
+          <a:off x="0" y="0"/>
+          <a:ext cx="0" cy="0"/>
+          <a:chOff x="0" y="0"/>
+          <a:chExt cx="0" cy="0"/>
+        </a:xfrm>
+      </p:grpSpPr>
+      <p:sp>
+        <p:nvSpPr>
+          <p:cNvPr id="2" name="Marcador de imagen de diapositiva 1"/>
+          <p:cNvSpPr>
+            <a:spLocks noGrp="1" noRot="1" noChangeAspect="1"/>
+          </p:cNvSpPr>
+          <p:nvPr>
+            <p:ph type="sldImg"/>
+          </p:nvPr>
+        </p:nvSpPr>
+        <p:spPr/>
+      </p:sp>
+      <p:sp>
+        <p:nvSpPr>
+          <p:cNvPr id="3" name="Marcador de notas 2"/>
+          <p:cNvSpPr>
+            <a:spLocks noGrp="1"/>
+          </p:cNvSpPr>
+          <p:nvPr>
+            <p:ph type="body" idx="1"/>
+          </p:nvPr>
+        </p:nvSpPr>
+        <p:spPr/>
+        <p:txBody>
+          <a:bodyPr/>
+          <a:lstStyle/>
+          <a:p>
+            <a:endParaRPr lang="es-CR" dirty="0"/>
+          </a:p>
+        </p:txBody>
+      </p:sp>
+      <p:sp>
+        <p:nvSpPr>
+          <p:cNvPr id="4" name="Marcador de número de diapositiva 3"/>
+          <p:cNvSpPr>
+            <a:spLocks noGrp="1"/>
+          </p:cNvSpPr>
+          <p:nvPr>
+            <p:ph type="sldNum" sz="quarter" idx="5"/>
+          </p:nvPr>
+        </p:nvSpPr>
+        <p:spPr/>
+        <p:txBody>
+          <a:bodyPr/>
+          <a:lstStyle/>
+          <a:p>
+            <a:fld id="{31023962-D872-411F-99A7-2359604E1F56}" type="slidenum">
+              <a:rPr lang="es-CR" smtClean="0"/>
+              <a:t>1</a:t>
+            </a:fld>
+            <a:endParaRPr lang="es-CR"/>
+          </a:p>
+        </p:txBody>
+      </p:sp>
+    </p:spTree>
+    <p:extLst>
+      <p:ext uri="{BB962C8B-B14F-4D97-AF65-F5344CB8AC3E}">
+        <p14:creationId xmlns:p14="http://schemas.microsoft.com/office/powerpoint/2010/main" val="1568491713"/>
+      </p:ext>
+    </p:extLst>
+  </p:cSld>
+  <p:clrMapOvr>
+    <a:masterClrMapping/>
+  </p:clrMapOvr>
+</p:notes>
+</file>
+
 <file path=ppt/slideLayouts/slideLayout1.xml><?xml version="1.0" encoding="utf-8"?>
 <p:sldLayout xmlns:a="http://schemas.openxmlformats.org/drawingml/2006/main" xmlns:r="http://schemas.openxmlformats.org/officeDocument/2006/relationships" xmlns:p="http://schemas.openxmlformats.org/presentationml/2006/main" type="title" preserve="1">
   <p:cSld name="Diapositiva de título">
@@ -267,7 +704,7 @@
           <a:p>
             <a:fld id="{2184BA85-EC42-4704-A8A2-A215E817F459}" type="datetimeFigureOut">
               <a:rPr lang="es-CR" smtClean="0"/>
-              <a:t>29/10/2024</a:t>
+              <a:t>3/11/2024</a:t>
             </a:fld>
             <a:endParaRPr lang="es-CR"/>
           </a:p>
@@ -467,7 +904,7 @@
           <a:p>
             <a:fld id="{2184BA85-EC42-4704-A8A2-A215E817F459}" type="datetimeFigureOut">
               <a:rPr lang="es-CR" smtClean="0"/>
-              <a:t>29/10/2024</a:t>
+              <a:t>3/11/2024</a:t>
             </a:fld>
             <a:endParaRPr lang="es-CR"/>
           </a:p>
@@ -677,7 +1114,7 @@
           <a:p>
             <a:fld id="{2184BA85-EC42-4704-A8A2-A215E817F459}" type="datetimeFigureOut">
               <a:rPr lang="es-CR" smtClean="0"/>
-              <a:t>29/10/2024</a:t>
+              <a:t>3/11/2024</a:t>
             </a:fld>
             <a:endParaRPr lang="es-CR"/>
           </a:p>
@@ -877,7 +1314,7 @@
           <a:p>
             <a:fld id="{2184BA85-EC42-4704-A8A2-A215E817F459}" type="datetimeFigureOut">
               <a:rPr lang="es-CR" smtClean="0"/>
-              <a:t>29/10/2024</a:t>
+              <a:t>3/11/2024</a:t>
             </a:fld>
             <a:endParaRPr lang="es-CR"/>
           </a:p>
@@ -1153,7 +1590,7 @@
           <a:p>
             <a:fld id="{2184BA85-EC42-4704-A8A2-A215E817F459}" type="datetimeFigureOut">
               <a:rPr lang="es-CR" smtClean="0"/>
-              <a:t>29/10/2024</a:t>
+              <a:t>3/11/2024</a:t>
             </a:fld>
             <a:endParaRPr lang="es-CR"/>
           </a:p>
@@ -1421,7 +1858,7 @@
           <a:p>
             <a:fld id="{2184BA85-EC42-4704-A8A2-A215E817F459}" type="datetimeFigureOut">
               <a:rPr lang="es-CR" smtClean="0"/>
-              <a:t>29/10/2024</a:t>
+              <a:t>3/11/2024</a:t>
             </a:fld>
             <a:endParaRPr lang="es-CR"/>
           </a:p>
@@ -1836,7 +2273,7 @@
           <a:p>
             <a:fld id="{2184BA85-EC42-4704-A8A2-A215E817F459}" type="datetimeFigureOut">
               <a:rPr lang="es-CR" smtClean="0"/>
-              <a:t>29/10/2024</a:t>
+              <a:t>3/11/2024</a:t>
             </a:fld>
             <a:endParaRPr lang="es-CR"/>
           </a:p>
@@ -1978,7 +2415,7 @@
           <a:p>
             <a:fld id="{2184BA85-EC42-4704-A8A2-A215E817F459}" type="datetimeFigureOut">
               <a:rPr lang="es-CR" smtClean="0"/>
-              <a:t>29/10/2024</a:t>
+              <a:t>3/11/2024</a:t>
             </a:fld>
             <a:endParaRPr lang="es-CR"/>
           </a:p>
@@ -2091,7 +2528,7 @@
           <a:p>
             <a:fld id="{2184BA85-EC42-4704-A8A2-A215E817F459}" type="datetimeFigureOut">
               <a:rPr lang="es-CR" smtClean="0"/>
-              <a:t>29/10/2024</a:t>
+              <a:t>3/11/2024</a:t>
             </a:fld>
             <a:endParaRPr lang="es-CR"/>
           </a:p>
@@ -2404,7 +2841,7 @@
           <a:p>
             <a:fld id="{2184BA85-EC42-4704-A8A2-A215E817F459}" type="datetimeFigureOut">
               <a:rPr lang="es-CR" smtClean="0"/>
-              <a:t>29/10/2024</a:t>
+              <a:t>3/11/2024</a:t>
             </a:fld>
             <a:endParaRPr lang="es-CR"/>
           </a:p>
@@ -2693,7 +3130,7 @@
           <a:p>
             <a:fld id="{2184BA85-EC42-4704-A8A2-A215E817F459}" type="datetimeFigureOut">
               <a:rPr lang="es-CR" smtClean="0"/>
-              <a:t>29/10/2024</a:t>
+              <a:t>3/11/2024</a:t>
             </a:fld>
             <a:endParaRPr lang="es-CR"/>
           </a:p>
@@ -2936,7 +3373,7 @@
           <a:p>
             <a:fld id="{2184BA85-EC42-4704-A8A2-A215E817F459}" type="datetimeFigureOut">
               <a:rPr lang="es-CR" smtClean="0"/>
-              <a:t>29/10/2024</a:t>
+              <a:t>3/11/2024</a:t>
             </a:fld>
             <a:endParaRPr lang="es-CR"/>
           </a:p>
@@ -3375,7 +3812,7 @@
         </p:nvSpPr>
         <p:spPr>
           <a:xfrm>
-            <a:off x="3639312" y="2212848"/>
+            <a:off x="2258568" y="1828800"/>
             <a:ext cx="1088136" cy="1655064"/>
           </a:xfrm>
           <a:prstGeom prst="triangle">
@@ -3427,7 +3864,7 @@
         </p:nvSpPr>
         <p:spPr>
           <a:xfrm>
-            <a:off x="3095244" y="2941320"/>
+            <a:off x="1714500" y="2557272"/>
             <a:ext cx="1088136" cy="926592"/>
           </a:xfrm>
           <a:prstGeom prst="triangle">
@@ -3481,7 +3918,7 @@
         </p:nvSpPr>
         <p:spPr>
           <a:xfrm>
-            <a:off x="4338066" y="2782824"/>
+            <a:off x="2957322" y="2398776"/>
             <a:ext cx="778764" cy="1085088"/>
           </a:xfrm>
           <a:prstGeom prst="triangle">
@@ -3535,7 +3972,7 @@
         </p:nvSpPr>
         <p:spPr>
           <a:xfrm>
-            <a:off x="8058914" y="1597152"/>
+            <a:off x="6678170" y="1213104"/>
             <a:ext cx="1088136" cy="1655064"/>
           </a:xfrm>
           <a:prstGeom prst="triangle">
@@ -3589,7 +4026,7 @@
         </p:nvSpPr>
         <p:spPr>
           <a:xfrm>
-            <a:off x="8448296" y="2325624"/>
+            <a:off x="7067552" y="1941576"/>
             <a:ext cx="1088136" cy="926592"/>
           </a:xfrm>
           <a:prstGeom prst="triangle">
@@ -3643,7 +4080,7 @@
         </p:nvSpPr>
         <p:spPr>
           <a:xfrm>
-            <a:off x="6309362" y="4672584"/>
+            <a:off x="4928618" y="4288536"/>
             <a:ext cx="713230" cy="1370076"/>
           </a:xfrm>
           <a:prstGeom prst="triangle">
@@ -3697,7 +4134,7 @@
         </p:nvSpPr>
         <p:spPr>
           <a:xfrm>
-            <a:off x="5959986" y="5312664"/>
+            <a:off x="4579242" y="4928616"/>
             <a:ext cx="625600" cy="729996"/>
           </a:xfrm>
           <a:prstGeom prst="triangle">
@@ -3737,6 +4174,114 @@
           </a:p>
         </p:txBody>
       </p:sp>
+      <p:sp>
+        <p:nvSpPr>
+          <p:cNvPr id="11" name="Triángulo isósceles 10">
+            <a:extLst>
+              <a:ext uri="{FF2B5EF4-FFF2-40B4-BE49-F238E27FC236}">
+                <a16:creationId xmlns:a16="http://schemas.microsoft.com/office/drawing/2014/main" id="{35B01D91-CA95-5695-4466-07608913C77A}"/>
+              </a:ext>
+            </a:extLst>
+          </p:cNvPr>
+          <p:cNvSpPr/>
+          <p:nvPr/>
+        </p:nvSpPr>
+        <p:spPr>
+          <a:xfrm>
+            <a:off x="9084375" y="4434840"/>
+            <a:ext cx="1088136" cy="926592"/>
+          </a:xfrm>
+          <a:prstGeom prst="triangle">
+            <a:avLst>
+              <a:gd name="adj" fmla="val 21429"/>
+            </a:avLst>
+          </a:prstGeom>
+          <a:solidFill>
+            <a:srgbClr val="00B050"/>
+          </a:solidFill>
+          <a:ln>
+            <a:noFill/>
+          </a:ln>
+        </p:spPr>
+        <p:style>
+          <a:lnRef idx="2">
+            <a:schemeClr val="accent1">
+              <a:shade val="15000"/>
+            </a:schemeClr>
+          </a:lnRef>
+          <a:fillRef idx="1">
+            <a:schemeClr val="accent1"/>
+          </a:fillRef>
+          <a:effectRef idx="0">
+            <a:schemeClr val="accent1"/>
+          </a:effectRef>
+          <a:fontRef idx="minor">
+            <a:schemeClr val="lt1"/>
+          </a:fontRef>
+        </p:style>
+        <p:txBody>
+          <a:bodyPr rtlCol="0" anchor="ctr"/>
+          <a:lstStyle/>
+          <a:p>
+            <a:pPr algn="ctr"/>
+            <a:endParaRPr lang="es-CR"/>
+          </a:p>
+        </p:txBody>
+      </p:sp>
+      <p:sp>
+        <p:nvSpPr>
+          <p:cNvPr id="12" name="Triángulo isósceles 11">
+            <a:extLst>
+              <a:ext uri="{FF2B5EF4-FFF2-40B4-BE49-F238E27FC236}">
+                <a16:creationId xmlns:a16="http://schemas.microsoft.com/office/drawing/2014/main" id="{6F8CA5AB-F551-1D65-7EBC-2DE8209E70B6}"/>
+              </a:ext>
+            </a:extLst>
+          </p:cNvPr>
+          <p:cNvSpPr/>
+          <p:nvPr/>
+        </p:nvSpPr>
+        <p:spPr>
+          <a:xfrm>
+            <a:off x="9302878" y="4161282"/>
+            <a:ext cx="1088136" cy="1200150"/>
+          </a:xfrm>
+          <a:prstGeom prst="triangle">
+            <a:avLst>
+              <a:gd name="adj" fmla="val 73530"/>
+            </a:avLst>
+          </a:prstGeom>
+          <a:solidFill>
+            <a:srgbClr val="00B050"/>
+          </a:solidFill>
+          <a:ln>
+            <a:noFill/>
+          </a:ln>
+        </p:spPr>
+        <p:style>
+          <a:lnRef idx="2">
+            <a:schemeClr val="accent1">
+              <a:shade val="15000"/>
+            </a:schemeClr>
+          </a:lnRef>
+          <a:fillRef idx="1">
+            <a:schemeClr val="accent1"/>
+          </a:fillRef>
+          <a:effectRef idx="0">
+            <a:schemeClr val="accent1"/>
+          </a:effectRef>
+          <a:fontRef idx="minor">
+            <a:schemeClr val="lt1"/>
+          </a:fontRef>
+        </p:style>
+        <p:txBody>
+          <a:bodyPr rtlCol="0" anchor="ctr"/>
+          <a:lstStyle/>
+          <a:p>
+            <a:pPr algn="ctr"/>
+            <a:endParaRPr lang="es-CR"/>
+          </a:p>
+        </p:txBody>
+      </p:sp>
     </p:spTree>
     <p:extLst>
       <p:ext uri="{BB962C8B-B14F-4D97-AF65-F5344CB8AC3E}">
@@ -3751,6 +4296,300 @@
 </file>
 
 <file path=ppt/slides/slide2.xml><?xml version="1.0" encoding="utf-8"?>
+<p:sld xmlns:a="http://schemas.openxmlformats.org/drawingml/2006/main" xmlns:r="http://schemas.openxmlformats.org/officeDocument/2006/relationships" xmlns:p="http://schemas.openxmlformats.org/presentationml/2006/main">
+  <p:cSld>
+    <p:spTree>
+      <p:nvGrpSpPr>
+        <p:cNvPr id="1" name="">
+          <a:extLst>
+            <a:ext uri="{FF2B5EF4-FFF2-40B4-BE49-F238E27FC236}">
+              <a16:creationId xmlns:a16="http://schemas.microsoft.com/office/drawing/2014/main" id="{CEA8E551-CF12-9FDD-A74E-D4292F5E6FAF}"/>
+            </a:ext>
+          </a:extLst>
+        </p:cNvPr>
+        <p:cNvGrpSpPr/>
+        <p:nvPr/>
+      </p:nvGrpSpPr>
+      <p:grpSpPr>
+        <a:xfrm>
+          <a:off x="0" y="0"/>
+          <a:ext cx="0" cy="0"/>
+          <a:chOff x="0" y="0"/>
+          <a:chExt cx="0" cy="0"/>
+        </a:xfrm>
+      </p:grpSpPr>
+      <p:pic>
+        <p:nvPicPr>
+          <p:cNvPr id="11" name="Gráfico 10" descr="Señal de negación con relleno sólido">
+            <a:extLst>
+              <a:ext uri="{FF2B5EF4-FFF2-40B4-BE49-F238E27FC236}">
+                <a16:creationId xmlns:a16="http://schemas.microsoft.com/office/drawing/2014/main" id="{8D014A0D-AB23-867F-BC84-E13D5B6040C8}"/>
+              </a:ext>
+            </a:extLst>
+          </p:cNvPr>
+          <p:cNvPicPr>
+            <a:picLocks noChangeAspect="1"/>
+          </p:cNvPicPr>
+          <p:nvPr/>
+        </p:nvPicPr>
+        <p:blipFill>
+          <a:blip r:embed="rId2">
+            <a:extLst>
+              <a:ext uri="{96DAC541-7B7A-43D3-8B79-37D633B846F1}">
+                <asvg:svgBlip xmlns:asvg="http://schemas.microsoft.com/office/drawing/2016/SVG/main" r:embed="rId3"/>
+              </a:ext>
+            </a:extLst>
+          </a:blip>
+          <a:stretch>
+            <a:fillRect/>
+          </a:stretch>
+        </p:blipFill>
+        <p:spPr>
+          <a:xfrm>
+            <a:off x="524904" y="159336"/>
+            <a:ext cx="4028160" cy="4028160"/>
+          </a:xfrm>
+          <a:prstGeom prst="rect">
+            <a:avLst/>
+          </a:prstGeom>
+        </p:spPr>
+      </p:pic>
+      <p:sp>
+        <p:nvSpPr>
+          <p:cNvPr id="5" name="Gráfico 3" descr="Señal de negación con relleno sólido">
+            <a:extLst>
+              <a:ext uri="{FF2B5EF4-FFF2-40B4-BE49-F238E27FC236}">
+                <a16:creationId xmlns:a16="http://schemas.microsoft.com/office/drawing/2014/main" id="{BC8032BE-997A-5DA1-82B8-94A6EE2BB06D}"/>
+              </a:ext>
+            </a:extLst>
+          </p:cNvPr>
+          <p:cNvSpPr/>
+          <p:nvPr/>
+        </p:nvSpPr>
+        <p:spPr>
+          <a:xfrm>
+            <a:off x="4412326" y="1633224"/>
+            <a:ext cx="3188960" cy="3188960"/>
+          </a:xfrm>
+          <a:custGeom>
+            <a:avLst/>
+            <a:gdLst>
+              <a:gd name="connsiteX0" fmla="*/ 1594480 w 3188960"/>
+              <a:gd name="connsiteY0" fmla="*/ 0 h 3188960"/>
+              <a:gd name="connsiteX1" fmla="*/ 0 w 3188960"/>
+              <a:gd name="connsiteY1" fmla="*/ 1594480 h 3188960"/>
+              <a:gd name="connsiteX2" fmla="*/ 1594480 w 3188960"/>
+              <a:gd name="connsiteY2" fmla="*/ 3188960 h 3188960"/>
+              <a:gd name="connsiteX3" fmla="*/ 3188960 w 3188960"/>
+              <a:gd name="connsiteY3" fmla="*/ 1594480 h 3188960"/>
+              <a:gd name="connsiteX4" fmla="*/ 1594480 w 3188960"/>
+              <a:gd name="connsiteY4" fmla="*/ 0 h 3188960"/>
+              <a:gd name="connsiteX5" fmla="*/ 503520 w 3188960"/>
+              <a:gd name="connsiteY5" fmla="*/ 1594480 h 3188960"/>
+              <a:gd name="connsiteX6" fmla="*/ 667164 w 3188960"/>
+              <a:gd name="connsiteY6" fmla="*/ 1023824 h 3188960"/>
+              <a:gd name="connsiteX7" fmla="*/ 2169332 w 3188960"/>
+              <a:gd name="connsiteY7" fmla="*/ 2525992 h 3188960"/>
+              <a:gd name="connsiteX8" fmla="*/ 1594480 w 3188960"/>
+              <a:gd name="connsiteY8" fmla="*/ 2685440 h 3188960"/>
+              <a:gd name="connsiteX9" fmla="*/ 503520 w 3188960"/>
+              <a:gd name="connsiteY9" fmla="*/ 1594480 h 3188960"/>
+              <a:gd name="connsiteX10" fmla="*/ 2521796 w 3188960"/>
+              <a:gd name="connsiteY10" fmla="*/ 2165136 h 3188960"/>
+              <a:gd name="connsiteX11" fmla="*/ 1023824 w 3188960"/>
+              <a:gd name="connsiteY11" fmla="*/ 667164 h 3188960"/>
+              <a:gd name="connsiteX12" fmla="*/ 1594480 w 3188960"/>
+              <a:gd name="connsiteY12" fmla="*/ 503520 h 3188960"/>
+              <a:gd name="connsiteX13" fmla="*/ 2685440 w 3188960"/>
+              <a:gd name="connsiteY13" fmla="*/ 1594480 h 3188960"/>
+              <a:gd name="connsiteX14" fmla="*/ 2521796 w 3188960"/>
+              <a:gd name="connsiteY14" fmla="*/ 2165136 h 3188960"/>
+            </a:gdLst>
+            <a:ahLst/>
+            <a:cxnLst>
+              <a:cxn ang="0">
+                <a:pos x="connsiteX0" y="connsiteY0"/>
+              </a:cxn>
+              <a:cxn ang="0">
+                <a:pos x="connsiteX1" y="connsiteY1"/>
+              </a:cxn>
+              <a:cxn ang="0">
+                <a:pos x="connsiteX2" y="connsiteY2"/>
+              </a:cxn>
+              <a:cxn ang="0">
+                <a:pos x="connsiteX3" y="connsiteY3"/>
+              </a:cxn>
+              <a:cxn ang="0">
+                <a:pos x="connsiteX4" y="connsiteY4"/>
+              </a:cxn>
+              <a:cxn ang="0">
+                <a:pos x="connsiteX5" y="connsiteY5"/>
+              </a:cxn>
+              <a:cxn ang="0">
+                <a:pos x="connsiteX6" y="connsiteY6"/>
+              </a:cxn>
+              <a:cxn ang="0">
+                <a:pos x="connsiteX7" y="connsiteY7"/>
+              </a:cxn>
+              <a:cxn ang="0">
+                <a:pos x="connsiteX8" y="connsiteY8"/>
+              </a:cxn>
+              <a:cxn ang="0">
+                <a:pos x="connsiteX9" y="connsiteY9"/>
+              </a:cxn>
+              <a:cxn ang="0">
+                <a:pos x="connsiteX10" y="connsiteY10"/>
+              </a:cxn>
+              <a:cxn ang="0">
+                <a:pos x="connsiteX11" y="connsiteY11"/>
+              </a:cxn>
+              <a:cxn ang="0">
+                <a:pos x="connsiteX12" y="connsiteY12"/>
+              </a:cxn>
+              <a:cxn ang="0">
+                <a:pos x="connsiteX13" y="connsiteY13"/>
+              </a:cxn>
+              <a:cxn ang="0">
+                <a:pos x="connsiteX14" y="connsiteY14"/>
+              </a:cxn>
+            </a:cxnLst>
+            <a:rect l="l" t="t" r="r" b="b"/>
+            <a:pathLst>
+              <a:path w="3188960" h="3188960">
+                <a:moveTo>
+                  <a:pt x="1594480" y="0"/>
+                </a:moveTo>
+                <a:cubicBezTo>
+                  <a:pt x="713320" y="0"/>
+                  <a:pt x="0" y="713320"/>
+                  <a:pt x="0" y="1594480"/>
+                </a:cubicBezTo>
+                <a:cubicBezTo>
+                  <a:pt x="0" y="2475640"/>
+                  <a:pt x="713320" y="3188960"/>
+                  <a:pt x="1594480" y="3188960"/>
+                </a:cubicBezTo>
+                <a:cubicBezTo>
+                  <a:pt x="2475640" y="3188960"/>
+                  <a:pt x="3188960" y="2475640"/>
+                  <a:pt x="3188960" y="1594480"/>
+                </a:cubicBezTo>
+                <a:cubicBezTo>
+                  <a:pt x="3188960" y="713320"/>
+                  <a:pt x="2475640" y="0"/>
+                  <a:pt x="1594480" y="0"/>
+                </a:cubicBezTo>
+                <a:close/>
+                <a:moveTo>
+                  <a:pt x="503520" y="1594480"/>
+                </a:moveTo>
+                <a:cubicBezTo>
+                  <a:pt x="503520" y="1384680"/>
+                  <a:pt x="562264" y="1187468"/>
+                  <a:pt x="667164" y="1023824"/>
+                </a:cubicBezTo>
+                <a:lnTo>
+                  <a:pt x="2169332" y="2525992"/>
+                </a:lnTo>
+                <a:cubicBezTo>
+                  <a:pt x="2001492" y="2626696"/>
+                  <a:pt x="1804280" y="2685440"/>
+                  <a:pt x="1594480" y="2685440"/>
+                </a:cubicBezTo>
+                <a:cubicBezTo>
+                  <a:pt x="994452" y="2685440"/>
+                  <a:pt x="503520" y="2194508"/>
+                  <a:pt x="503520" y="1594480"/>
+                </a:cubicBezTo>
+                <a:close/>
+                <a:moveTo>
+                  <a:pt x="2521796" y="2165136"/>
+                </a:moveTo>
+                <a:lnTo>
+                  <a:pt x="1023824" y="667164"/>
+                </a:lnTo>
+                <a:cubicBezTo>
+                  <a:pt x="1187468" y="562264"/>
+                  <a:pt x="1384680" y="503520"/>
+                  <a:pt x="1594480" y="503520"/>
+                </a:cubicBezTo>
+                <a:cubicBezTo>
+                  <a:pt x="2194508" y="503520"/>
+                  <a:pt x="2685440" y="994452"/>
+                  <a:pt x="2685440" y="1594480"/>
+                </a:cubicBezTo>
+                <a:cubicBezTo>
+                  <a:pt x="2685440" y="1804280"/>
+                  <a:pt x="2626696" y="2001492"/>
+                  <a:pt x="2521796" y="2165136"/>
+                </a:cubicBezTo>
+                <a:close/>
+              </a:path>
+            </a:pathLst>
+          </a:custGeom>
+          <a:solidFill>
+            <a:srgbClr val="FF0000"/>
+          </a:solidFill>
+          <a:ln w="127000" cap="flat">
+            <a:solidFill>
+              <a:schemeClr val="tx1"/>
+            </a:solidFill>
+            <a:prstDash val="solid"/>
+            <a:miter/>
+          </a:ln>
+        </p:spPr>
+        <p:txBody>
+          <a:bodyPr rtlCol="0" anchor="ctr"/>
+          <a:lstStyle/>
+          <a:p>
+            <a:endParaRPr lang="es-CR"/>
+          </a:p>
+        </p:txBody>
+      </p:sp>
+      <p:pic>
+        <p:nvPicPr>
+          <p:cNvPr id="6" name="Imagen 5">
+            <a:extLst>
+              <a:ext uri="{FF2B5EF4-FFF2-40B4-BE49-F238E27FC236}">
+                <a16:creationId xmlns:a16="http://schemas.microsoft.com/office/drawing/2014/main" id="{A7D141DE-4689-B128-E20F-7209B4C2296A}"/>
+              </a:ext>
+            </a:extLst>
+          </p:cNvPr>
+          <p:cNvPicPr>
+            <a:picLocks noChangeAspect="1"/>
+          </p:cNvPicPr>
+          <p:nvPr/>
+        </p:nvPicPr>
+        <p:blipFill>
+          <a:blip r:embed="rId4"/>
+          <a:stretch>
+            <a:fillRect/>
+          </a:stretch>
+        </p:blipFill>
+        <p:spPr>
+          <a:xfrm>
+            <a:off x="8589120" y="2913744"/>
+            <a:ext cx="3316511" cy="3316511"/>
+          </a:xfrm>
+          <a:prstGeom prst="rect">
+            <a:avLst/>
+          </a:prstGeom>
+        </p:spPr>
+      </p:pic>
+    </p:spTree>
+    <p:extLst>
+      <p:ext uri="{BB962C8B-B14F-4D97-AF65-F5344CB8AC3E}">
+        <p14:creationId xmlns:p14="http://schemas.microsoft.com/office/powerpoint/2010/main" val="2358685363"/>
+      </p:ext>
+    </p:extLst>
+  </p:cSld>
+  <p:clrMapOvr>
+    <a:masterClrMapping/>
+  </p:clrMapOvr>
+</p:sld>
+</file>
+
+<file path=ppt/slides/slide3.xml><?xml version="1.0" encoding="utf-8"?>
 <p:sld xmlns:a="http://schemas.openxmlformats.org/drawingml/2006/main" xmlns:r="http://schemas.openxmlformats.org/officeDocument/2006/relationships" xmlns:p="http://schemas.openxmlformats.org/presentationml/2006/main">
   <p:cSld>
     <p:spTree>
@@ -4340,7 +5179,7 @@
 </p:sld>
 </file>
 
-<file path=ppt/slides/slide3.xml><?xml version="1.0" encoding="utf-8"?>
+<file path=ppt/slides/slide4.xml><?xml version="1.0" encoding="utf-8"?>
 <p:sld xmlns:a="http://schemas.openxmlformats.org/drawingml/2006/main" xmlns:r="http://schemas.openxmlformats.org/officeDocument/2006/relationships" xmlns:p="http://schemas.openxmlformats.org/presentationml/2006/main">
   <p:cSld>
     <p:spTree>
@@ -4548,7 +5387,7 @@
 </p:sld>
 </file>
 
-<file path=ppt/slides/slide4.xml><?xml version="1.0" encoding="utf-8"?>
+<file path=ppt/slides/slide5.xml><?xml version="1.0" encoding="utf-8"?>
 <p:sld xmlns:a="http://schemas.openxmlformats.org/drawingml/2006/main" xmlns:r="http://schemas.openxmlformats.org/officeDocument/2006/relationships" xmlns:p="http://schemas.openxmlformats.org/presentationml/2006/main">
   <p:cSld>
     <p:spTree>
@@ -4720,7 +5559,7 @@
 </p:sld>
 </file>
 
-<file path=ppt/slides/slide5.xml><?xml version="1.0" encoding="utf-8"?>
+<file path=ppt/slides/slide6.xml><?xml version="1.0" encoding="utf-8"?>
 <p:sld xmlns:a="http://schemas.openxmlformats.org/drawingml/2006/main" xmlns:r="http://schemas.openxmlformats.org/officeDocument/2006/relationships" xmlns:p="http://schemas.openxmlformats.org/presentationml/2006/main">
   <p:cSld>
     <p:spTree>
@@ -4856,7 +5695,7 @@
 </p:sld>
 </file>
 
-<file path=ppt/slides/slide6.xml><?xml version="1.0" encoding="utf-8"?>
+<file path=ppt/slides/slide7.xml><?xml version="1.0" encoding="utf-8"?>
 <p:sld xmlns:a="http://schemas.openxmlformats.org/drawingml/2006/main" xmlns:r="http://schemas.openxmlformats.org/officeDocument/2006/relationships" xmlns:p="http://schemas.openxmlformats.org/presentationml/2006/main">
   <p:cSld>
     <p:spTree>
@@ -4977,300 +5816,6 @@
     <p:extLst>
       <p:ext uri="{BB962C8B-B14F-4D97-AF65-F5344CB8AC3E}">
         <p14:creationId xmlns:p14="http://schemas.microsoft.com/office/powerpoint/2010/main" val="372839521"/>
-      </p:ext>
-    </p:extLst>
-  </p:cSld>
-  <p:clrMapOvr>
-    <a:masterClrMapping/>
-  </p:clrMapOvr>
-</p:sld>
-</file>
-
-<file path=ppt/slides/slide7.xml><?xml version="1.0" encoding="utf-8"?>
-<p:sld xmlns:a="http://schemas.openxmlformats.org/drawingml/2006/main" xmlns:r="http://schemas.openxmlformats.org/officeDocument/2006/relationships" xmlns:p="http://schemas.openxmlformats.org/presentationml/2006/main">
-  <p:cSld>
-    <p:spTree>
-      <p:nvGrpSpPr>
-        <p:cNvPr id="1" name="">
-          <a:extLst>
-            <a:ext uri="{FF2B5EF4-FFF2-40B4-BE49-F238E27FC236}">
-              <a16:creationId xmlns:a16="http://schemas.microsoft.com/office/drawing/2014/main" id="{CEA8E551-CF12-9FDD-A74E-D4292F5E6FAF}"/>
-            </a:ext>
-          </a:extLst>
-        </p:cNvPr>
-        <p:cNvGrpSpPr/>
-        <p:nvPr/>
-      </p:nvGrpSpPr>
-      <p:grpSpPr>
-        <a:xfrm>
-          <a:off x="0" y="0"/>
-          <a:ext cx="0" cy="0"/>
-          <a:chOff x="0" y="0"/>
-          <a:chExt cx="0" cy="0"/>
-        </a:xfrm>
-      </p:grpSpPr>
-      <p:pic>
-        <p:nvPicPr>
-          <p:cNvPr id="11" name="Gráfico 10" descr="Señal de negación con relleno sólido">
-            <a:extLst>
-              <a:ext uri="{FF2B5EF4-FFF2-40B4-BE49-F238E27FC236}">
-                <a16:creationId xmlns:a16="http://schemas.microsoft.com/office/drawing/2014/main" id="{8D014A0D-AB23-867F-BC84-E13D5B6040C8}"/>
-              </a:ext>
-            </a:extLst>
-          </p:cNvPr>
-          <p:cNvPicPr>
-            <a:picLocks noChangeAspect="1"/>
-          </p:cNvPicPr>
-          <p:nvPr/>
-        </p:nvPicPr>
-        <p:blipFill>
-          <a:blip r:embed="rId2">
-            <a:extLst>
-              <a:ext uri="{96DAC541-7B7A-43D3-8B79-37D633B846F1}">
-                <asvg:svgBlip xmlns:asvg="http://schemas.microsoft.com/office/drawing/2016/SVG/main" r:embed="rId3"/>
-              </a:ext>
-            </a:extLst>
-          </a:blip>
-          <a:stretch>
-            <a:fillRect/>
-          </a:stretch>
-        </p:blipFill>
-        <p:spPr>
-          <a:xfrm>
-            <a:off x="524904" y="159336"/>
-            <a:ext cx="4028160" cy="4028160"/>
-          </a:xfrm>
-          <a:prstGeom prst="rect">
-            <a:avLst/>
-          </a:prstGeom>
-        </p:spPr>
-      </p:pic>
-      <p:sp>
-        <p:nvSpPr>
-          <p:cNvPr id="5" name="Gráfico 3" descr="Señal de negación con relleno sólido">
-            <a:extLst>
-              <a:ext uri="{FF2B5EF4-FFF2-40B4-BE49-F238E27FC236}">
-                <a16:creationId xmlns:a16="http://schemas.microsoft.com/office/drawing/2014/main" id="{BC8032BE-997A-5DA1-82B8-94A6EE2BB06D}"/>
-              </a:ext>
-            </a:extLst>
-          </p:cNvPr>
-          <p:cNvSpPr/>
-          <p:nvPr/>
-        </p:nvSpPr>
-        <p:spPr>
-          <a:xfrm>
-            <a:off x="4412326" y="1633224"/>
-            <a:ext cx="3188960" cy="3188960"/>
-          </a:xfrm>
-          <a:custGeom>
-            <a:avLst/>
-            <a:gdLst>
-              <a:gd name="connsiteX0" fmla="*/ 1594480 w 3188960"/>
-              <a:gd name="connsiteY0" fmla="*/ 0 h 3188960"/>
-              <a:gd name="connsiteX1" fmla="*/ 0 w 3188960"/>
-              <a:gd name="connsiteY1" fmla="*/ 1594480 h 3188960"/>
-              <a:gd name="connsiteX2" fmla="*/ 1594480 w 3188960"/>
-              <a:gd name="connsiteY2" fmla="*/ 3188960 h 3188960"/>
-              <a:gd name="connsiteX3" fmla="*/ 3188960 w 3188960"/>
-              <a:gd name="connsiteY3" fmla="*/ 1594480 h 3188960"/>
-              <a:gd name="connsiteX4" fmla="*/ 1594480 w 3188960"/>
-              <a:gd name="connsiteY4" fmla="*/ 0 h 3188960"/>
-              <a:gd name="connsiteX5" fmla="*/ 503520 w 3188960"/>
-              <a:gd name="connsiteY5" fmla="*/ 1594480 h 3188960"/>
-              <a:gd name="connsiteX6" fmla="*/ 667164 w 3188960"/>
-              <a:gd name="connsiteY6" fmla="*/ 1023824 h 3188960"/>
-              <a:gd name="connsiteX7" fmla="*/ 2169332 w 3188960"/>
-              <a:gd name="connsiteY7" fmla="*/ 2525992 h 3188960"/>
-              <a:gd name="connsiteX8" fmla="*/ 1594480 w 3188960"/>
-              <a:gd name="connsiteY8" fmla="*/ 2685440 h 3188960"/>
-              <a:gd name="connsiteX9" fmla="*/ 503520 w 3188960"/>
-              <a:gd name="connsiteY9" fmla="*/ 1594480 h 3188960"/>
-              <a:gd name="connsiteX10" fmla="*/ 2521796 w 3188960"/>
-              <a:gd name="connsiteY10" fmla="*/ 2165136 h 3188960"/>
-              <a:gd name="connsiteX11" fmla="*/ 1023824 w 3188960"/>
-              <a:gd name="connsiteY11" fmla="*/ 667164 h 3188960"/>
-              <a:gd name="connsiteX12" fmla="*/ 1594480 w 3188960"/>
-              <a:gd name="connsiteY12" fmla="*/ 503520 h 3188960"/>
-              <a:gd name="connsiteX13" fmla="*/ 2685440 w 3188960"/>
-              <a:gd name="connsiteY13" fmla="*/ 1594480 h 3188960"/>
-              <a:gd name="connsiteX14" fmla="*/ 2521796 w 3188960"/>
-              <a:gd name="connsiteY14" fmla="*/ 2165136 h 3188960"/>
-            </a:gdLst>
-            <a:ahLst/>
-            <a:cxnLst>
-              <a:cxn ang="0">
-                <a:pos x="connsiteX0" y="connsiteY0"/>
-              </a:cxn>
-              <a:cxn ang="0">
-                <a:pos x="connsiteX1" y="connsiteY1"/>
-              </a:cxn>
-              <a:cxn ang="0">
-                <a:pos x="connsiteX2" y="connsiteY2"/>
-              </a:cxn>
-              <a:cxn ang="0">
-                <a:pos x="connsiteX3" y="connsiteY3"/>
-              </a:cxn>
-              <a:cxn ang="0">
-                <a:pos x="connsiteX4" y="connsiteY4"/>
-              </a:cxn>
-              <a:cxn ang="0">
-                <a:pos x="connsiteX5" y="connsiteY5"/>
-              </a:cxn>
-              <a:cxn ang="0">
-                <a:pos x="connsiteX6" y="connsiteY6"/>
-              </a:cxn>
-              <a:cxn ang="0">
-                <a:pos x="connsiteX7" y="connsiteY7"/>
-              </a:cxn>
-              <a:cxn ang="0">
-                <a:pos x="connsiteX8" y="connsiteY8"/>
-              </a:cxn>
-              <a:cxn ang="0">
-                <a:pos x="connsiteX9" y="connsiteY9"/>
-              </a:cxn>
-              <a:cxn ang="0">
-                <a:pos x="connsiteX10" y="connsiteY10"/>
-              </a:cxn>
-              <a:cxn ang="0">
-                <a:pos x="connsiteX11" y="connsiteY11"/>
-              </a:cxn>
-              <a:cxn ang="0">
-                <a:pos x="connsiteX12" y="connsiteY12"/>
-              </a:cxn>
-              <a:cxn ang="0">
-                <a:pos x="connsiteX13" y="connsiteY13"/>
-              </a:cxn>
-              <a:cxn ang="0">
-                <a:pos x="connsiteX14" y="connsiteY14"/>
-              </a:cxn>
-            </a:cxnLst>
-            <a:rect l="l" t="t" r="r" b="b"/>
-            <a:pathLst>
-              <a:path w="3188960" h="3188960">
-                <a:moveTo>
-                  <a:pt x="1594480" y="0"/>
-                </a:moveTo>
-                <a:cubicBezTo>
-                  <a:pt x="713320" y="0"/>
-                  <a:pt x="0" y="713320"/>
-                  <a:pt x="0" y="1594480"/>
-                </a:cubicBezTo>
-                <a:cubicBezTo>
-                  <a:pt x="0" y="2475640"/>
-                  <a:pt x="713320" y="3188960"/>
-                  <a:pt x="1594480" y="3188960"/>
-                </a:cubicBezTo>
-                <a:cubicBezTo>
-                  <a:pt x="2475640" y="3188960"/>
-                  <a:pt x="3188960" y="2475640"/>
-                  <a:pt x="3188960" y="1594480"/>
-                </a:cubicBezTo>
-                <a:cubicBezTo>
-                  <a:pt x="3188960" y="713320"/>
-                  <a:pt x="2475640" y="0"/>
-                  <a:pt x="1594480" y="0"/>
-                </a:cubicBezTo>
-                <a:close/>
-                <a:moveTo>
-                  <a:pt x="503520" y="1594480"/>
-                </a:moveTo>
-                <a:cubicBezTo>
-                  <a:pt x="503520" y="1384680"/>
-                  <a:pt x="562264" y="1187468"/>
-                  <a:pt x="667164" y="1023824"/>
-                </a:cubicBezTo>
-                <a:lnTo>
-                  <a:pt x="2169332" y="2525992"/>
-                </a:lnTo>
-                <a:cubicBezTo>
-                  <a:pt x="2001492" y="2626696"/>
-                  <a:pt x="1804280" y="2685440"/>
-                  <a:pt x="1594480" y="2685440"/>
-                </a:cubicBezTo>
-                <a:cubicBezTo>
-                  <a:pt x="994452" y="2685440"/>
-                  <a:pt x="503520" y="2194508"/>
-                  <a:pt x="503520" y="1594480"/>
-                </a:cubicBezTo>
-                <a:close/>
-                <a:moveTo>
-                  <a:pt x="2521796" y="2165136"/>
-                </a:moveTo>
-                <a:lnTo>
-                  <a:pt x="1023824" y="667164"/>
-                </a:lnTo>
-                <a:cubicBezTo>
-                  <a:pt x="1187468" y="562264"/>
-                  <a:pt x="1384680" y="503520"/>
-                  <a:pt x="1594480" y="503520"/>
-                </a:cubicBezTo>
-                <a:cubicBezTo>
-                  <a:pt x="2194508" y="503520"/>
-                  <a:pt x="2685440" y="994452"/>
-                  <a:pt x="2685440" y="1594480"/>
-                </a:cubicBezTo>
-                <a:cubicBezTo>
-                  <a:pt x="2685440" y="1804280"/>
-                  <a:pt x="2626696" y="2001492"/>
-                  <a:pt x="2521796" y="2165136"/>
-                </a:cubicBezTo>
-                <a:close/>
-              </a:path>
-            </a:pathLst>
-          </a:custGeom>
-          <a:solidFill>
-            <a:srgbClr val="FF0000"/>
-          </a:solidFill>
-          <a:ln w="127000" cap="flat">
-            <a:solidFill>
-              <a:schemeClr val="tx1"/>
-            </a:solidFill>
-            <a:prstDash val="solid"/>
-            <a:miter/>
-          </a:ln>
-        </p:spPr>
-        <p:txBody>
-          <a:bodyPr rtlCol="0" anchor="ctr"/>
-          <a:lstStyle/>
-          <a:p>
-            <a:endParaRPr lang="es-CR"/>
-          </a:p>
-        </p:txBody>
-      </p:sp>
-      <p:pic>
-        <p:nvPicPr>
-          <p:cNvPr id="6" name="Imagen 5">
-            <a:extLst>
-              <a:ext uri="{FF2B5EF4-FFF2-40B4-BE49-F238E27FC236}">
-                <a16:creationId xmlns:a16="http://schemas.microsoft.com/office/drawing/2014/main" id="{A7D141DE-4689-B128-E20F-7209B4C2296A}"/>
-              </a:ext>
-            </a:extLst>
-          </p:cNvPr>
-          <p:cNvPicPr>
-            <a:picLocks noChangeAspect="1"/>
-          </p:cNvPicPr>
-          <p:nvPr/>
-        </p:nvPicPr>
-        <p:blipFill>
-          <a:blip r:embed="rId4"/>
-          <a:stretch>
-            <a:fillRect/>
-          </a:stretch>
-        </p:blipFill>
-        <p:spPr>
-          <a:xfrm>
-            <a:off x="8589120" y="2913744"/>
-            <a:ext cx="3316511" cy="3316511"/>
-          </a:xfrm>
-          <a:prstGeom prst="rect">
-            <a:avLst/>
-          </a:prstGeom>
-        </p:spPr>
-      </p:pic>
-    </p:spTree>
-    <p:extLst>
-      <p:ext uri="{BB962C8B-B14F-4D97-AF65-F5344CB8AC3E}">
-        <p14:creationId xmlns:p14="http://schemas.microsoft.com/office/powerpoint/2010/main" val="2358685363"/>
       </p:ext>
     </p:extLst>
   </p:cSld>
@@ -5593,4 +6138,319 @@
     </a:ext>
   </a:extLst>
 </a:theme>
+</file>
+
+<file path=ppt/theme/theme2.xml><?xml version="1.0" encoding="utf-8"?>
+<a:theme xmlns:a="http://schemas.openxmlformats.org/drawingml/2006/main" name="Tema de Office">
+  <a:themeElements>
+    <a:clrScheme name="Office">
+      <a:dk1>
+        <a:sysClr val="windowText" lastClr="000000"/>
+      </a:dk1>
+      <a:lt1>
+        <a:sysClr val="window" lastClr="FFFFFF"/>
+      </a:lt1>
+      <a:dk2>
+        <a:srgbClr val="0E2841"/>
+      </a:dk2>
+      <a:lt2>
+        <a:srgbClr val="E8E8E8"/>
+      </a:lt2>
+      <a:accent1>
+        <a:srgbClr val="156082"/>
+      </a:accent1>
+      <a:accent2>
+        <a:srgbClr val="E97132"/>
+      </a:accent2>
+      <a:accent3>
+        <a:srgbClr val="196B24"/>
+      </a:accent3>
+      <a:accent4>
+        <a:srgbClr val="0F9ED5"/>
+      </a:accent4>
+      <a:accent5>
+        <a:srgbClr val="A02B93"/>
+      </a:accent5>
+      <a:accent6>
+        <a:srgbClr val="4EA72E"/>
+      </a:accent6>
+      <a:hlink>
+        <a:srgbClr val="467886"/>
+      </a:hlink>
+      <a:folHlink>
+        <a:srgbClr val="96607D"/>
+      </a:folHlink>
+    </a:clrScheme>
+    <a:fontScheme name="Office">
+      <a:majorFont>
+        <a:latin typeface="Aptos Display" panose="02110004020202020204"/>
+        <a:ea typeface=""/>
+        <a:cs typeface=""/>
+        <a:font script="Jpan" typeface="游ゴシック Light"/>
+        <a:font script="Hang" typeface="맑은 고딕"/>
+        <a:font script="Hans" typeface="等线 Light"/>
+        <a:font script="Hant" typeface="新細明體"/>
+        <a:font script="Arab" typeface="Times New Roman"/>
+        <a:font script="Hebr" typeface="Times New Roman"/>
+        <a:font script="Thai" typeface="Angsana New"/>
+        <a:font script="Ethi" typeface="Nyala"/>
+        <a:font script="Beng" typeface="Vrinda"/>
+        <a:font script="Gujr" typeface="Shruti"/>
+        <a:font script="Khmr" typeface="MoolBoran"/>
+        <a:font script="Knda" typeface="Tunga"/>
+        <a:font script="Guru" typeface="Raavi"/>
+        <a:font script="Cans" typeface="Euphemia"/>
+        <a:font script="Cher" typeface="Plantagenet Cherokee"/>
+        <a:font script="Yiii" typeface="Microsoft Yi Baiti"/>
+        <a:font script="Tibt" typeface="Microsoft Himalaya"/>
+        <a:font script="Thaa" typeface="MV Boli"/>
+        <a:font script="Deva" typeface="Mangal"/>
+        <a:font script="Telu" typeface="Gautami"/>
+        <a:font script="Taml" typeface="Latha"/>
+        <a:font script="Syrc" typeface="Estrangelo Edessa"/>
+        <a:font script="Orya" typeface="Kalinga"/>
+        <a:font script="Mlym" typeface="Kartika"/>
+        <a:font script="Laoo" typeface="DokChampa"/>
+        <a:font script="Sinh" typeface="Iskoola Pota"/>
+        <a:font script="Mong" typeface="Mongolian Baiti"/>
+        <a:font script="Viet" typeface="Times New Roman"/>
+        <a:font script="Uigh" typeface="Microsoft Uighur"/>
+        <a:font script="Geor" typeface="Sylfaen"/>
+        <a:font script="Armn" typeface="Arial"/>
+        <a:font script="Bugi" typeface="Leelawadee UI"/>
+        <a:font script="Bopo" typeface="Microsoft JhengHei"/>
+        <a:font script="Java" typeface="Javanese Text"/>
+        <a:font script="Lisu" typeface="Segoe UI"/>
+        <a:font script="Mymr" typeface="Myanmar Text"/>
+        <a:font script="Nkoo" typeface="Ebrima"/>
+        <a:font script="Olck" typeface="Nirmala UI"/>
+        <a:font script="Osma" typeface="Ebrima"/>
+        <a:font script="Phag" typeface="Phagspa"/>
+        <a:font script="Syrn" typeface="Estrangelo Edessa"/>
+        <a:font script="Syrj" typeface="Estrangelo Edessa"/>
+        <a:font script="Syre" typeface="Estrangelo Edessa"/>
+        <a:font script="Sora" typeface="Nirmala UI"/>
+        <a:font script="Tale" typeface="Microsoft Tai Le"/>
+        <a:font script="Talu" typeface="Microsoft New Tai Lue"/>
+        <a:font script="Tfng" typeface="Ebrima"/>
+      </a:majorFont>
+      <a:minorFont>
+        <a:latin typeface="Aptos" panose="02110004020202020204"/>
+        <a:ea typeface=""/>
+        <a:cs typeface=""/>
+        <a:font script="Jpan" typeface="游ゴシック"/>
+        <a:font script="Hang" typeface="맑은 고딕"/>
+        <a:font script="Hans" typeface="等线"/>
+        <a:font script="Hant" typeface="新細明體"/>
+        <a:font script="Arab" typeface="Arial"/>
+        <a:font script="Hebr" typeface="Arial"/>
+        <a:font script="Thai" typeface="Cordia New"/>
+        <a:font script="Ethi" typeface="Nyala"/>
+        <a:font script="Beng" typeface="Vrinda"/>
+        <a:font script="Gujr" typeface="Shruti"/>
+        <a:font script="Khmr" typeface="DaunPenh"/>
+        <a:font script="Knda" typeface="Tunga"/>
+        <a:font script="Guru" typeface="Raavi"/>
+        <a:font script="Cans" typeface="Euphemia"/>
+        <a:font script="Cher" typeface="Plantagenet Cherokee"/>
+        <a:font script="Yiii" typeface="Microsoft Yi Baiti"/>
+        <a:font script="Tibt" typeface="Microsoft Himalaya"/>
+        <a:font script="Thaa" typeface="MV Boli"/>
+        <a:font script="Deva" typeface="Mangal"/>
+        <a:font script="Telu" typeface="Gautami"/>
+        <a:font script="Taml" typeface="Latha"/>
+        <a:font script="Syrc" typeface="Estrangelo Edessa"/>
+        <a:font script="Orya" typeface="Kalinga"/>
+        <a:font script="Mlym" typeface="Kartika"/>
+        <a:font script="Laoo" typeface="DokChampa"/>
+        <a:font script="Sinh" typeface="Iskoola Pota"/>
+        <a:font script="Mong" typeface="Mongolian Baiti"/>
+        <a:font script="Viet" typeface="Arial"/>
+        <a:font script="Uigh" typeface="Microsoft Uighur"/>
+        <a:font script="Geor" typeface="Sylfaen"/>
+        <a:font script="Armn" typeface="Arial"/>
+        <a:font script="Bugi" typeface="Leelawadee UI"/>
+        <a:font script="Bopo" typeface="Microsoft JhengHei"/>
+        <a:font script="Java" typeface="Javanese Text"/>
+        <a:font script="Lisu" typeface="Segoe UI"/>
+        <a:font script="Mymr" typeface="Myanmar Text"/>
+        <a:font script="Nkoo" typeface="Ebrima"/>
+        <a:font script="Olck" typeface="Nirmala UI"/>
+        <a:font script="Osma" typeface="Ebrima"/>
+        <a:font script="Phag" typeface="Phagspa"/>
+        <a:font script="Syrn" typeface="Estrangelo Edessa"/>
+        <a:font script="Syrj" typeface="Estrangelo Edessa"/>
+        <a:font script="Syre" typeface="Estrangelo Edessa"/>
+        <a:font script="Sora" typeface="Nirmala UI"/>
+        <a:font script="Tale" typeface="Microsoft Tai Le"/>
+        <a:font script="Talu" typeface="Microsoft New Tai Lue"/>
+        <a:font script="Tfng" typeface="Ebrima"/>
+      </a:minorFont>
+    </a:fontScheme>
+    <a:fmtScheme name="Office">
+      <a:fillStyleLst>
+        <a:solidFill>
+          <a:schemeClr val="phClr"/>
+        </a:solidFill>
+        <a:gradFill rotWithShape="1">
+          <a:gsLst>
+            <a:gs pos="0">
+              <a:schemeClr val="phClr">
+                <a:lumMod val="110000"/>
+                <a:satMod val="105000"/>
+                <a:tint val="67000"/>
+              </a:schemeClr>
+            </a:gs>
+            <a:gs pos="50000">
+              <a:schemeClr val="phClr">
+                <a:lumMod val="105000"/>
+                <a:satMod val="103000"/>
+                <a:tint val="73000"/>
+              </a:schemeClr>
+            </a:gs>
+            <a:gs pos="100000">
+              <a:schemeClr val="phClr">
+                <a:lumMod val="105000"/>
+                <a:satMod val="109000"/>
+                <a:tint val="81000"/>
+              </a:schemeClr>
+            </a:gs>
+          </a:gsLst>
+          <a:lin ang="5400000" scaled="0"/>
+        </a:gradFill>
+        <a:gradFill rotWithShape="1">
+          <a:gsLst>
+            <a:gs pos="0">
+              <a:schemeClr val="phClr">
+                <a:satMod val="103000"/>
+                <a:lumMod val="102000"/>
+                <a:tint val="94000"/>
+              </a:schemeClr>
+            </a:gs>
+            <a:gs pos="50000">
+              <a:schemeClr val="phClr">
+                <a:satMod val="110000"/>
+                <a:lumMod val="100000"/>
+                <a:shade val="100000"/>
+              </a:schemeClr>
+            </a:gs>
+            <a:gs pos="100000">
+              <a:schemeClr val="phClr">
+                <a:lumMod val="99000"/>
+                <a:satMod val="120000"/>
+                <a:shade val="78000"/>
+              </a:schemeClr>
+            </a:gs>
+          </a:gsLst>
+          <a:lin ang="5400000" scaled="0"/>
+        </a:gradFill>
+      </a:fillStyleLst>
+      <a:lnStyleLst>
+        <a:ln w="12700" cap="flat" cmpd="sng" algn="ctr">
+          <a:solidFill>
+            <a:schemeClr val="phClr"/>
+          </a:solidFill>
+          <a:prstDash val="solid"/>
+          <a:miter lim="800000"/>
+        </a:ln>
+        <a:ln w="19050" cap="flat" cmpd="sng" algn="ctr">
+          <a:solidFill>
+            <a:schemeClr val="phClr"/>
+          </a:solidFill>
+          <a:prstDash val="solid"/>
+          <a:miter lim="800000"/>
+        </a:ln>
+        <a:ln w="25400" cap="flat" cmpd="sng" algn="ctr">
+          <a:solidFill>
+            <a:schemeClr val="phClr"/>
+          </a:solidFill>
+          <a:prstDash val="solid"/>
+          <a:miter lim="800000"/>
+        </a:ln>
+      </a:lnStyleLst>
+      <a:effectStyleLst>
+        <a:effectStyle>
+          <a:effectLst/>
+        </a:effectStyle>
+        <a:effectStyle>
+          <a:effectLst/>
+        </a:effectStyle>
+        <a:effectStyle>
+          <a:effectLst>
+            <a:outerShdw blurRad="57150" dist="19050" dir="5400000" algn="ctr" rotWithShape="0">
+              <a:srgbClr val="000000">
+                <a:alpha val="63000"/>
+              </a:srgbClr>
+            </a:outerShdw>
+          </a:effectLst>
+        </a:effectStyle>
+      </a:effectStyleLst>
+      <a:bgFillStyleLst>
+        <a:solidFill>
+          <a:schemeClr val="phClr"/>
+        </a:solidFill>
+        <a:solidFill>
+          <a:schemeClr val="phClr">
+            <a:tint val="95000"/>
+            <a:satMod val="170000"/>
+          </a:schemeClr>
+        </a:solidFill>
+        <a:gradFill rotWithShape="1">
+          <a:gsLst>
+            <a:gs pos="0">
+              <a:schemeClr val="phClr">
+                <a:tint val="93000"/>
+                <a:satMod val="150000"/>
+                <a:shade val="98000"/>
+                <a:lumMod val="102000"/>
+              </a:schemeClr>
+            </a:gs>
+            <a:gs pos="50000">
+              <a:schemeClr val="phClr">
+                <a:tint val="98000"/>
+                <a:satMod val="130000"/>
+                <a:shade val="90000"/>
+                <a:lumMod val="103000"/>
+              </a:schemeClr>
+            </a:gs>
+            <a:gs pos="100000">
+              <a:schemeClr val="phClr">
+                <a:shade val="63000"/>
+                <a:satMod val="120000"/>
+              </a:schemeClr>
+            </a:gs>
+          </a:gsLst>
+          <a:lin ang="5400000" scaled="0"/>
+        </a:gradFill>
+      </a:bgFillStyleLst>
+    </a:fmtScheme>
+  </a:themeElements>
+  <a:objectDefaults>
+    <a:lnDef>
+      <a:spPr/>
+      <a:bodyPr/>
+      <a:lstStyle/>
+      <a:style>
+        <a:lnRef idx="2">
+          <a:schemeClr val="accent1"/>
+        </a:lnRef>
+        <a:fillRef idx="0">
+          <a:schemeClr val="accent1"/>
+        </a:fillRef>
+        <a:effectRef idx="1">
+          <a:schemeClr val="accent1"/>
+        </a:effectRef>
+        <a:fontRef idx="minor">
+          <a:schemeClr val="tx1"/>
+        </a:fontRef>
+      </a:style>
+    </a:lnDef>
+  </a:objectDefaults>
+  <a:extraClrSchemeLst/>
+  <a:extLst>
+    <a:ext uri="{05A4C25C-085E-4340-85A3-A5531E510DB2}">
+      <thm15:themeFamily xmlns:thm15="http://schemas.microsoft.com/office/thememl/2012/main" name="Office Theme" id="{2E142A2C-CD16-42D6-873A-C26D2A0506FA}" vid="{1BDDFF52-6CD6-40A5-AB3C-68EB2F1E4D0A}"/>
+    </a:ext>
+  </a:extLst>
+</a:theme>
 </file>
</xml_diff>